<commit_message>
added barrel, added gravity to barrel, made barrel end game, and took away jump power.
</commit_message>
<xml_diff>
--- a/powerpoint_game.pptx
+++ b/powerpoint_game.pptx
@@ -119,6 +119,30 @@
 <file path=ppt/changesInfos/changesInfo1.xml><?xml version="1.0" encoding="utf-8"?>
 <pc:chgInfo xmlns:a="http://schemas.openxmlformats.org/drawingml/2006/main" xmlns:r="http://schemas.openxmlformats.org/officeDocument/2006/relationships" xmlns:ac="http://schemas.microsoft.com/office/drawing/2013/main/command" xmlns:pc="http://schemas.microsoft.com/office/powerpoint/2013/main/command">
   <pc:docChgLst>
+    <pc:chgData name="Azzolina, Logan '26" userId="a2c7a4c4-8694-4746-916d-b789f5c5b837" providerId="ADAL" clId="{CD6C611B-C204-41D2-B6F6-734180A5C40C}"/>
+    <pc:docChg chg="modSld">
+      <pc:chgData name="Azzolina, Logan '26" userId="a2c7a4c4-8694-4746-916d-b789f5c5b837" providerId="ADAL" clId="{CD6C611B-C204-41D2-B6F6-734180A5C40C}" dt="2024-11-20T19:14:38.965" v="0" actId="20577"/>
+      <pc:docMkLst>
+        <pc:docMk/>
+      </pc:docMkLst>
+      <pc:sldChg chg="modSp mod">
+        <pc:chgData name="Azzolina, Logan '26" userId="a2c7a4c4-8694-4746-916d-b789f5c5b837" providerId="ADAL" clId="{CD6C611B-C204-41D2-B6F6-734180A5C40C}" dt="2024-11-20T19:14:38.965" v="0" actId="20577"/>
+        <pc:sldMkLst>
+          <pc:docMk/>
+          <pc:sldMk cId="3513733059" sldId="257"/>
+        </pc:sldMkLst>
+        <pc:spChg chg="mod">
+          <ac:chgData name="Azzolina, Logan '26" userId="a2c7a4c4-8694-4746-916d-b789f5c5b837" providerId="ADAL" clId="{CD6C611B-C204-41D2-B6F6-734180A5C40C}" dt="2024-11-20T19:14:38.965" v="0" actId="20577"/>
+          <ac:spMkLst>
+            <pc:docMk/>
+            <pc:sldMk cId="3513733059" sldId="257"/>
+            <ac:spMk id="7" creationId="{7E84AB6D-E1FB-A957-CB0E-4C68342E1158}"/>
+          </ac:spMkLst>
+        </pc:spChg>
+      </pc:sldChg>
+    </pc:docChg>
+  </pc:docChgLst>
+  <pc:docChgLst>
     <pc:chgData name="Azzolina, Logan '26" userId="a2c7a4c4-8694-4746-916d-b789f5c5b837" providerId="ADAL" clId="{44CE8BF2-0603-4F18-9558-392434F66239}"/>
     <pc:docChg chg="custSel modSld">
       <pc:chgData name="Azzolina, Logan '26" userId="a2c7a4c4-8694-4746-916d-b789f5c5b837" providerId="ADAL" clId="{44CE8BF2-0603-4F18-9558-392434F66239}" dt="2024-10-31T15:46:35.035" v="45" actId="20577"/>
@@ -243,7 +267,7 @@
           <a:p>
             <a:fld id="{5062FCC4-B70A-4AC9-BDAE-A3ABC7D9ECCC}" type="datetimeFigureOut">
               <a:rPr lang="en-US" smtClean="0"/>
-              <a:t>10/31/2024</a:t>
+              <a:t>11/20/2024</a:t>
             </a:fld>
             <a:endParaRPr lang="en-US"/>
           </a:p>
@@ -666,7 +690,7 @@
           <a:p>
             <a:fld id="{02AC24A9-CCB6-4F8D-B8DB-C2F3692CFA5A}" type="datetimeFigureOut">
               <a:rPr lang="en-US" smtClean="0"/>
-              <a:t>10/31/2024</a:t>
+              <a:t>11/20/2024</a:t>
             </a:fld>
             <a:endParaRPr lang="en-US" dirty="0"/>
           </a:p>
@@ -1036,7 +1060,7 @@
           <a:p>
             <a:fld id="{02AC24A9-CCB6-4F8D-B8DB-C2F3692CFA5A}" type="datetimeFigureOut">
               <a:rPr lang="en-US" smtClean="0"/>
-              <a:t>10/31/2024</a:t>
+              <a:t>11/20/2024</a:t>
             </a:fld>
             <a:endParaRPr lang="en-US"/>
           </a:p>
@@ -1245,7 +1269,7 @@
           <a:p>
             <a:fld id="{02AC24A9-CCB6-4F8D-B8DB-C2F3692CFA5A}" type="datetimeFigureOut">
               <a:rPr lang="en-US" smtClean="0"/>
-              <a:t>10/31/2024</a:t>
+              <a:t>11/20/2024</a:t>
             </a:fld>
             <a:endParaRPr lang="en-US"/>
           </a:p>
@@ -1715,7 +1739,7 @@
           <a:p>
             <a:fld id="{02AC24A9-CCB6-4F8D-B8DB-C2F3692CFA5A}" type="datetimeFigureOut">
               <a:rPr lang="en-US" smtClean="0"/>
-              <a:t>10/31/2024</a:t>
+              <a:t>11/20/2024</a:t>
             </a:fld>
             <a:endParaRPr lang="en-US"/>
           </a:p>
@@ -2169,7 +2193,7 @@
           <a:p>
             <a:fld id="{02AC24A9-CCB6-4F8D-B8DB-C2F3692CFA5A}" type="datetimeFigureOut">
               <a:rPr lang="en-US" smtClean="0"/>
-              <a:t>10/31/2024</a:t>
+              <a:t>11/20/2024</a:t>
             </a:fld>
             <a:endParaRPr lang="en-US"/>
           </a:p>
@@ -2701,7 +2725,7 @@
           <a:p>
             <a:fld id="{02AC24A9-CCB6-4F8D-B8DB-C2F3692CFA5A}" type="datetimeFigureOut">
               <a:rPr lang="en-US" smtClean="0"/>
-              <a:t>10/31/2024</a:t>
+              <a:t>11/20/2024</a:t>
             </a:fld>
             <a:endParaRPr lang="en-US"/>
           </a:p>
@@ -3400,7 +3424,7 @@
           <a:p>
             <a:fld id="{02AC24A9-CCB6-4F8D-B8DB-C2F3692CFA5A}" type="datetimeFigureOut">
               <a:rPr lang="en-US" smtClean="0"/>
-              <a:t>10/31/2024</a:t>
+              <a:t>11/20/2024</a:t>
             </a:fld>
             <a:endParaRPr lang="en-US"/>
           </a:p>
@@ -3729,7 +3753,7 @@
           <a:p>
             <a:fld id="{02AC24A9-CCB6-4F8D-B8DB-C2F3692CFA5A}" type="datetimeFigureOut">
               <a:rPr lang="en-US" smtClean="0"/>
-              <a:t>10/31/2024</a:t>
+              <a:t>11/20/2024</a:t>
             </a:fld>
             <a:endParaRPr lang="en-US"/>
           </a:p>
@@ -3842,7 +3866,7 @@
           <a:p>
             <a:fld id="{02AC24A9-CCB6-4F8D-B8DB-C2F3692CFA5A}" type="datetimeFigureOut">
               <a:rPr lang="en-US" smtClean="0"/>
-              <a:t>10/31/2024</a:t>
+              <a:t>11/20/2024</a:t>
             </a:fld>
             <a:endParaRPr lang="en-US"/>
           </a:p>
@@ -4337,7 +4361,7 @@
           <a:p>
             <a:fld id="{02AC24A9-CCB6-4F8D-B8DB-C2F3692CFA5A}" type="datetimeFigureOut">
               <a:rPr lang="en-US" smtClean="0"/>
-              <a:t>10/31/2024</a:t>
+              <a:t>11/20/2024</a:t>
             </a:fld>
             <a:endParaRPr lang="en-US" dirty="0"/>
           </a:p>
@@ -4814,7 +4838,7 @@
           <a:p>
             <a:fld id="{02AC24A9-CCB6-4F8D-B8DB-C2F3692CFA5A}" type="datetimeFigureOut">
               <a:rPr lang="en-US" smtClean="0"/>
-              <a:t>10/31/2024</a:t>
+              <a:t>11/20/2024</a:t>
             </a:fld>
             <a:endParaRPr lang="en-US"/>
           </a:p>
@@ -5057,7 +5081,7 @@
           <a:p>
             <a:fld id="{02AC24A9-CCB6-4F8D-B8DB-C2F3692CFA5A}" type="datetimeFigureOut">
               <a:rPr lang="en-US" smtClean="0"/>
-              <a:t>10/31/2024</a:t>
+              <a:t>11/20/2024</a:t>
             </a:fld>
             <a:endParaRPr lang="en-US"/>
           </a:p>
@@ -6437,7 +6461,7 @@
         <p:spPr>
           <a:xfrm>
             <a:off x="9229725" y="3157538"/>
-            <a:ext cx="2607469" cy="3693319"/>
+            <a:ext cx="2607469" cy="3416320"/>
           </a:xfrm>
           <a:prstGeom prst="rect">
             <a:avLst/>
@@ -6452,7 +6476,15 @@
           <a:p>
             <a:r>
               <a:rPr lang="en-US" dirty="0"/>
-              <a:t>I plan to add some attention to detail to my game and make more levels. I am going to make it so The player can only barely jump up onto the walls, and </a:t>
+              <a:t>I plan to add some attention to detail to </a:t>
+            </a:r>
+            <a:r>
+              <a:rPr lang="en-US"/>
+              <a:t>my game. </a:t>
+            </a:r>
+            <a:r>
+              <a:rPr lang="en-US" dirty="0"/>
+              <a:t>I am going to make it so The player can only barely jump up onto the walls, and </a:t>
             </a:r>
             <a:r>
               <a:rPr lang="en-US" dirty="0" err="1"/>

</xml_diff>

<commit_message>
attempted to add high score file
</commit_message>
<xml_diff>
--- a/powerpoint_game.pptx
+++ b/powerpoint_game.pptx
@@ -121,16 +121,24 @@
   <pc:docChgLst>
     <pc:chgData name="Azzolina, Logan '26" userId="a2c7a4c4-8694-4746-916d-b789f5c5b837" providerId="ADAL" clId="{CD6C611B-C204-41D2-B6F6-734180A5C40C}"/>
     <pc:docChg chg="modSld">
-      <pc:chgData name="Azzolina, Logan '26" userId="a2c7a4c4-8694-4746-916d-b789f5c5b837" providerId="ADAL" clId="{CD6C611B-C204-41D2-B6F6-734180A5C40C}" dt="2024-11-20T19:14:38.965" v="0" actId="20577"/>
+      <pc:chgData name="Azzolina, Logan '26" userId="a2c7a4c4-8694-4746-916d-b789f5c5b837" providerId="ADAL" clId="{CD6C611B-C204-41D2-B6F6-734180A5C40C}" dt="2024-12-03T01:09:27.130" v="2" actId="1076"/>
       <pc:docMkLst>
         <pc:docMk/>
       </pc:docMkLst>
       <pc:sldChg chg="modSp mod">
-        <pc:chgData name="Azzolina, Logan '26" userId="a2c7a4c4-8694-4746-916d-b789f5c5b837" providerId="ADAL" clId="{CD6C611B-C204-41D2-B6F6-734180A5C40C}" dt="2024-11-20T19:14:38.965" v="0" actId="20577"/>
+        <pc:chgData name="Azzolina, Logan '26" userId="a2c7a4c4-8694-4746-916d-b789f5c5b837" providerId="ADAL" clId="{CD6C611B-C204-41D2-B6F6-734180A5C40C}" dt="2024-12-03T01:09:27.130" v="2" actId="1076"/>
         <pc:sldMkLst>
           <pc:docMk/>
           <pc:sldMk cId="3513733059" sldId="257"/>
         </pc:sldMkLst>
+        <pc:spChg chg="mod">
+          <ac:chgData name="Azzolina, Logan '26" userId="a2c7a4c4-8694-4746-916d-b789f5c5b837" providerId="ADAL" clId="{CD6C611B-C204-41D2-B6F6-734180A5C40C}" dt="2024-12-03T01:09:27.130" v="2" actId="1076"/>
+          <ac:spMkLst>
+            <pc:docMk/>
+            <pc:sldMk cId="3513733059" sldId="257"/>
+            <ac:spMk id="3" creationId="{3CEE5A6B-DFD3-11E4-4C11-5201625C3D3D}"/>
+          </ac:spMkLst>
+        </pc:spChg>
         <pc:spChg chg="mod">
           <ac:chgData name="Azzolina, Logan '26" userId="a2c7a4c4-8694-4746-916d-b789f5c5b837" providerId="ADAL" clId="{CD6C611B-C204-41D2-B6F6-734180A5C40C}" dt="2024-11-20T19:14:38.965" v="0" actId="20577"/>
           <ac:spMkLst>
@@ -267,7 +275,7 @@
           <a:p>
             <a:fld id="{5062FCC4-B70A-4AC9-BDAE-A3ABC7D9ECCC}" type="datetimeFigureOut">
               <a:rPr lang="en-US" smtClean="0"/>
-              <a:t>11/20/2024</a:t>
+              <a:t>12/2/2024</a:t>
             </a:fld>
             <a:endParaRPr lang="en-US"/>
           </a:p>
@@ -690,7 +698,7 @@
           <a:p>
             <a:fld id="{02AC24A9-CCB6-4F8D-B8DB-C2F3692CFA5A}" type="datetimeFigureOut">
               <a:rPr lang="en-US" smtClean="0"/>
-              <a:t>11/20/2024</a:t>
+              <a:t>12/2/2024</a:t>
             </a:fld>
             <a:endParaRPr lang="en-US" dirty="0"/>
           </a:p>
@@ -1060,7 +1068,7 @@
           <a:p>
             <a:fld id="{02AC24A9-CCB6-4F8D-B8DB-C2F3692CFA5A}" type="datetimeFigureOut">
               <a:rPr lang="en-US" smtClean="0"/>
-              <a:t>11/20/2024</a:t>
+              <a:t>12/2/2024</a:t>
             </a:fld>
             <a:endParaRPr lang="en-US"/>
           </a:p>
@@ -1269,7 +1277,7 @@
           <a:p>
             <a:fld id="{02AC24A9-CCB6-4F8D-B8DB-C2F3692CFA5A}" type="datetimeFigureOut">
               <a:rPr lang="en-US" smtClean="0"/>
-              <a:t>11/20/2024</a:t>
+              <a:t>12/2/2024</a:t>
             </a:fld>
             <a:endParaRPr lang="en-US"/>
           </a:p>
@@ -1739,7 +1747,7 @@
           <a:p>
             <a:fld id="{02AC24A9-CCB6-4F8D-B8DB-C2F3692CFA5A}" type="datetimeFigureOut">
               <a:rPr lang="en-US" smtClean="0"/>
-              <a:t>11/20/2024</a:t>
+              <a:t>12/2/2024</a:t>
             </a:fld>
             <a:endParaRPr lang="en-US"/>
           </a:p>
@@ -2193,7 +2201,7 @@
           <a:p>
             <a:fld id="{02AC24A9-CCB6-4F8D-B8DB-C2F3692CFA5A}" type="datetimeFigureOut">
               <a:rPr lang="en-US" smtClean="0"/>
-              <a:t>11/20/2024</a:t>
+              <a:t>12/2/2024</a:t>
             </a:fld>
             <a:endParaRPr lang="en-US"/>
           </a:p>
@@ -2725,7 +2733,7 @@
           <a:p>
             <a:fld id="{02AC24A9-CCB6-4F8D-B8DB-C2F3692CFA5A}" type="datetimeFigureOut">
               <a:rPr lang="en-US" smtClean="0"/>
-              <a:t>11/20/2024</a:t>
+              <a:t>12/2/2024</a:t>
             </a:fld>
             <a:endParaRPr lang="en-US"/>
           </a:p>
@@ -3424,7 +3432,7 @@
           <a:p>
             <a:fld id="{02AC24A9-CCB6-4F8D-B8DB-C2F3692CFA5A}" type="datetimeFigureOut">
               <a:rPr lang="en-US" smtClean="0"/>
-              <a:t>11/20/2024</a:t>
+              <a:t>12/2/2024</a:t>
             </a:fld>
             <a:endParaRPr lang="en-US"/>
           </a:p>
@@ -3753,7 +3761,7 @@
           <a:p>
             <a:fld id="{02AC24A9-CCB6-4F8D-B8DB-C2F3692CFA5A}" type="datetimeFigureOut">
               <a:rPr lang="en-US" smtClean="0"/>
-              <a:t>11/20/2024</a:t>
+              <a:t>12/2/2024</a:t>
             </a:fld>
             <a:endParaRPr lang="en-US"/>
           </a:p>
@@ -3866,7 +3874,7 @@
           <a:p>
             <a:fld id="{02AC24A9-CCB6-4F8D-B8DB-C2F3692CFA5A}" type="datetimeFigureOut">
               <a:rPr lang="en-US" smtClean="0"/>
-              <a:t>11/20/2024</a:t>
+              <a:t>12/2/2024</a:t>
             </a:fld>
             <a:endParaRPr lang="en-US"/>
           </a:p>
@@ -4361,7 +4369,7 @@
           <a:p>
             <a:fld id="{02AC24A9-CCB6-4F8D-B8DB-C2F3692CFA5A}" type="datetimeFigureOut">
               <a:rPr lang="en-US" smtClean="0"/>
-              <a:t>11/20/2024</a:t>
+              <a:t>12/2/2024</a:t>
             </a:fld>
             <a:endParaRPr lang="en-US" dirty="0"/>
           </a:p>
@@ -4838,7 +4846,7 @@
           <a:p>
             <a:fld id="{02AC24A9-CCB6-4F8D-B8DB-C2F3692CFA5A}" type="datetimeFigureOut">
               <a:rPr lang="en-US" smtClean="0"/>
-              <a:t>11/20/2024</a:t>
+              <a:t>12/2/2024</a:t>
             </a:fld>
             <a:endParaRPr lang="en-US"/>
           </a:p>
@@ -5081,7 +5089,7 @@
           <a:p>
             <a:fld id="{02AC24A9-CCB6-4F8D-B8DB-C2F3692CFA5A}" type="datetimeFigureOut">
               <a:rPr lang="en-US" smtClean="0"/>
-              <a:t>11/20/2024</a:t>
+              <a:t>12/2/2024</a:t>
             </a:fld>
             <a:endParaRPr lang="en-US"/>
           </a:p>
@@ -6278,7 +6286,7 @@
         </p:nvSpPr>
         <p:spPr>
           <a:xfrm>
-            <a:off x="600075" y="2771775"/>
+            <a:off x="585189" y="2755348"/>
             <a:ext cx="3393281" cy="2585323"/>
           </a:xfrm>
           <a:prstGeom prst="rect">

</xml_diff>